<commit_message>
Materials for summer 2025 workshop day
</commit_message>
<xml_diff>
--- a/GenAI 3 Practical Applications/Sketch of Gen AI workshop presentation.pptx
+++ b/GenAI 3 Practical Applications/Sketch of Gen AI workshop presentation.pptx
@@ -115,7 +115,41 @@
       </a:defRPr>
     </a:lvl9pPr>
   </p:defaultTextStyle>
+  <p:extLst>
+    <p:ext uri="{EFAFB233-063F-42B5-8137-9DF3F51BA10A}">
+      <p15:sldGuideLst xmlns:p15="http://schemas.microsoft.com/office/powerpoint/2012/main"/>
+    </p:ext>
+  </p:extLst>
 </p:presentation>
+</file>
+
+<file path=ppt/changesInfos/changesInfo1.xml><?xml version="1.0" encoding="utf-8"?>
+<pc:chgInfo xmlns:a="http://schemas.openxmlformats.org/drawingml/2006/main" xmlns:r="http://schemas.openxmlformats.org/officeDocument/2006/relationships" xmlns:ac="http://schemas.microsoft.com/office/drawing/2013/main/command" xmlns:pc="http://schemas.microsoft.com/office/powerpoint/2013/main/command">
+  <pc:docChgLst>
+    <pc:chgData name="Greta Linse" userId="0790268b80e7f0aa" providerId="LiveId" clId="{94F6180A-B197-48D9-B89E-25B721A56975}"/>
+    <pc:docChg chg="modSld">
+      <pc:chgData name="Greta Linse" userId="0790268b80e7f0aa" providerId="LiveId" clId="{94F6180A-B197-48D9-B89E-25B721A56975}" dt="2024-12-04T21:00:20.292" v="7" actId="20577"/>
+      <pc:docMkLst>
+        <pc:docMk/>
+      </pc:docMkLst>
+      <pc:sldChg chg="modSp mod">
+        <pc:chgData name="Greta Linse" userId="0790268b80e7f0aa" providerId="LiveId" clId="{94F6180A-B197-48D9-B89E-25B721A56975}" dt="2024-12-04T21:00:20.292" v="7" actId="20577"/>
+        <pc:sldMkLst>
+          <pc:docMk/>
+          <pc:sldMk cId="960074235" sldId="256"/>
+        </pc:sldMkLst>
+        <pc:spChg chg="mod">
+          <ac:chgData name="Greta Linse" userId="0790268b80e7f0aa" providerId="LiveId" clId="{94F6180A-B197-48D9-B89E-25B721A56975}" dt="2024-12-04T21:00:20.292" v="7" actId="20577"/>
+          <ac:spMkLst>
+            <pc:docMk/>
+            <pc:sldMk cId="960074235" sldId="256"/>
+            <ac:spMk id="4" creationId="{9AA10832-E93A-D831-1205-BE815D355822}"/>
+          </ac:spMkLst>
+        </pc:spChg>
+      </pc:sldChg>
+    </pc:docChg>
+  </pc:docChgLst>
+</pc:chgInfo>
 </file>
 
 <file path=ppt/slideLayouts/slideLayout1.xml><?xml version="1.0" encoding="utf-8"?>
@@ -265,7 +299,7 @@
           <a:p>
             <a:fld id="{D3FBD258-7686-4375-8A52-63AE5B4A5CED}" type="datetimeFigureOut">
               <a:rPr lang="en-US" smtClean="0"/>
-              <a:t>11/21/2024</a:t>
+              <a:t>12/4/2024</a:t>
             </a:fld>
             <a:endParaRPr lang="en-US"/>
           </a:p>
@@ -463,7 +497,7 @@
           <a:p>
             <a:fld id="{D3FBD258-7686-4375-8A52-63AE5B4A5CED}" type="datetimeFigureOut">
               <a:rPr lang="en-US" smtClean="0"/>
-              <a:t>11/21/2024</a:t>
+              <a:t>12/4/2024</a:t>
             </a:fld>
             <a:endParaRPr lang="en-US"/>
           </a:p>
@@ -671,7 +705,7 @@
           <a:p>
             <a:fld id="{D3FBD258-7686-4375-8A52-63AE5B4A5CED}" type="datetimeFigureOut">
               <a:rPr lang="en-US" smtClean="0"/>
-              <a:t>11/21/2024</a:t>
+              <a:t>12/4/2024</a:t>
             </a:fld>
             <a:endParaRPr lang="en-US"/>
           </a:p>
@@ -869,7 +903,7 @@
           <a:p>
             <a:fld id="{D3FBD258-7686-4375-8A52-63AE5B4A5CED}" type="datetimeFigureOut">
               <a:rPr lang="en-US" smtClean="0"/>
-              <a:t>11/21/2024</a:t>
+              <a:t>12/4/2024</a:t>
             </a:fld>
             <a:endParaRPr lang="en-US"/>
           </a:p>
@@ -1144,7 +1178,7 @@
           <a:p>
             <a:fld id="{D3FBD258-7686-4375-8A52-63AE5B4A5CED}" type="datetimeFigureOut">
               <a:rPr lang="en-US" smtClean="0"/>
-              <a:t>11/21/2024</a:t>
+              <a:t>12/4/2024</a:t>
             </a:fld>
             <a:endParaRPr lang="en-US"/>
           </a:p>
@@ -1409,7 +1443,7 @@
           <a:p>
             <a:fld id="{D3FBD258-7686-4375-8A52-63AE5B4A5CED}" type="datetimeFigureOut">
               <a:rPr lang="en-US" smtClean="0"/>
-              <a:t>11/21/2024</a:t>
+              <a:t>12/4/2024</a:t>
             </a:fld>
             <a:endParaRPr lang="en-US"/>
           </a:p>
@@ -1821,7 +1855,7 @@
           <a:p>
             <a:fld id="{D3FBD258-7686-4375-8A52-63AE5B4A5CED}" type="datetimeFigureOut">
               <a:rPr lang="en-US" smtClean="0"/>
-              <a:t>11/21/2024</a:t>
+              <a:t>12/4/2024</a:t>
             </a:fld>
             <a:endParaRPr lang="en-US"/>
           </a:p>
@@ -1962,7 +1996,7 @@
           <a:p>
             <a:fld id="{D3FBD258-7686-4375-8A52-63AE5B4A5CED}" type="datetimeFigureOut">
               <a:rPr lang="en-US" smtClean="0"/>
-              <a:t>11/21/2024</a:t>
+              <a:t>12/4/2024</a:t>
             </a:fld>
             <a:endParaRPr lang="en-US"/>
           </a:p>
@@ -2075,7 +2109,7 @@
           <a:p>
             <a:fld id="{D3FBD258-7686-4375-8A52-63AE5B4A5CED}" type="datetimeFigureOut">
               <a:rPr lang="en-US" smtClean="0"/>
-              <a:t>11/21/2024</a:t>
+              <a:t>12/4/2024</a:t>
             </a:fld>
             <a:endParaRPr lang="en-US"/>
           </a:p>
@@ -2386,7 +2420,7 @@
           <a:p>
             <a:fld id="{D3FBD258-7686-4375-8A52-63AE5B4A5CED}" type="datetimeFigureOut">
               <a:rPr lang="en-US" smtClean="0"/>
-              <a:t>11/21/2024</a:t>
+              <a:t>12/4/2024</a:t>
             </a:fld>
             <a:endParaRPr lang="en-US"/>
           </a:p>
@@ -2674,7 +2708,7 @@
           <a:p>
             <a:fld id="{D3FBD258-7686-4375-8A52-63AE5B4A5CED}" type="datetimeFigureOut">
               <a:rPr lang="en-US" smtClean="0"/>
-              <a:t>11/21/2024</a:t>
+              <a:t>12/4/2024</a:t>
             </a:fld>
             <a:endParaRPr lang="en-US"/>
           </a:p>
@@ -2915,7 +2949,7 @@
           <a:p>
             <a:fld id="{D3FBD258-7686-4375-8A52-63AE5B4A5CED}" type="datetimeFigureOut">
               <a:rPr lang="en-US" smtClean="0"/>
-              <a:t>11/21/2024</a:t>
+              <a:t>12/4/2024</a:t>
             </a:fld>
             <a:endParaRPr lang="en-US"/>
           </a:p>
@@ -3582,7 +3616,15 @@
           <a:p>
             <a:r>
               <a:rPr lang="en-US" dirty="0"/>
-              <a:t>Greta Linse, Sara Mannheimer, Ava, Sally Slipher</a:t>
+              <a:t>Greta Linse, Sara Mannheimer, Ava </a:t>
+            </a:r>
+            <a:r>
+              <a:rPr lang="en-US" dirty="0" err="1"/>
+              <a:t>Yazdian</a:t>
+            </a:r>
+            <a:r>
+              <a:rPr lang="en-US" dirty="0"/>
+              <a:t>, Sally Slipher</a:t>
             </a:r>
           </a:p>
         </p:txBody>

</xml_diff>